<commit_message>
Edited problem statement ppt
Edited problem statement ppt
</commit_message>
<xml_diff>
--- a/Problem statement.pptx
+++ b/Problem statement.pptx
@@ -8,7 +8,12 @@
     <p:sldId id="256" r:id="rId2"/>
     <p:sldId id="257" r:id="rId3"/>
     <p:sldId id="260" r:id="rId4"/>
-    <p:sldId id="258" r:id="rId5"/>
+    <p:sldId id="261" r:id="rId5"/>
+    <p:sldId id="262" r:id="rId6"/>
+    <p:sldId id="263" r:id="rId7"/>
+    <p:sldId id="265" r:id="rId8"/>
+    <p:sldId id="258" r:id="rId9"/>
+    <p:sldId id="266" r:id="rId10"/>
   </p:sldIdLst>
   <p:sldSz cx="12192000" cy="6858000"/>
   <p:notesSz cx="6858000" cy="9144000"/>
@@ -107,6 +112,11 @@
       </a:defRPr>
     </a:lvl9pPr>
   </p:defaultTextStyle>
+  <p:extLst>
+    <p:ext uri="{EFAFB233-063F-42B5-8137-9DF3F51BA10A}">
+      <p15:sldGuideLst xmlns:p15="http://schemas.microsoft.com/office/powerpoint/2012/main"/>
+    </p:ext>
+  </p:extLst>
 </p:presentation>
 </file>
 
@@ -257,7 +267,7 @@
           <a:p>
             <a:fld id="{256199A9-7968-4290-8E97-22DF45FF6498}" type="datetimeFigureOut">
               <a:rPr lang="en-US" smtClean="0"/>
-              <a:t>8/29/2020</a:t>
+              <a:t>8/31/2020</a:t>
             </a:fld>
             <a:endParaRPr lang="en-US"/>
           </a:p>
@@ -455,7 +465,7 @@
           <a:p>
             <a:fld id="{256199A9-7968-4290-8E97-22DF45FF6498}" type="datetimeFigureOut">
               <a:rPr lang="en-US" smtClean="0"/>
-              <a:t>8/29/2020</a:t>
+              <a:t>8/31/2020</a:t>
             </a:fld>
             <a:endParaRPr lang="en-US"/>
           </a:p>
@@ -663,7 +673,7 @@
           <a:p>
             <a:fld id="{256199A9-7968-4290-8E97-22DF45FF6498}" type="datetimeFigureOut">
               <a:rPr lang="en-US" smtClean="0"/>
-              <a:t>8/29/2020</a:t>
+              <a:t>8/31/2020</a:t>
             </a:fld>
             <a:endParaRPr lang="en-US"/>
           </a:p>
@@ -861,7 +871,7 @@
           <a:p>
             <a:fld id="{256199A9-7968-4290-8E97-22DF45FF6498}" type="datetimeFigureOut">
               <a:rPr lang="en-US" smtClean="0"/>
-              <a:t>8/29/2020</a:t>
+              <a:t>8/31/2020</a:t>
             </a:fld>
             <a:endParaRPr lang="en-US"/>
           </a:p>
@@ -1136,7 +1146,7 @@
           <a:p>
             <a:fld id="{256199A9-7968-4290-8E97-22DF45FF6498}" type="datetimeFigureOut">
               <a:rPr lang="en-US" smtClean="0"/>
-              <a:t>8/29/2020</a:t>
+              <a:t>8/31/2020</a:t>
             </a:fld>
             <a:endParaRPr lang="en-US"/>
           </a:p>
@@ -1401,7 +1411,7 @@
           <a:p>
             <a:fld id="{256199A9-7968-4290-8E97-22DF45FF6498}" type="datetimeFigureOut">
               <a:rPr lang="en-US" smtClean="0"/>
-              <a:t>8/29/2020</a:t>
+              <a:t>8/31/2020</a:t>
             </a:fld>
             <a:endParaRPr lang="en-US"/>
           </a:p>
@@ -1813,7 +1823,7 @@
           <a:p>
             <a:fld id="{256199A9-7968-4290-8E97-22DF45FF6498}" type="datetimeFigureOut">
               <a:rPr lang="en-US" smtClean="0"/>
-              <a:t>8/29/2020</a:t>
+              <a:t>8/31/2020</a:t>
             </a:fld>
             <a:endParaRPr lang="en-US"/>
           </a:p>
@@ -1954,7 +1964,7 @@
           <a:p>
             <a:fld id="{256199A9-7968-4290-8E97-22DF45FF6498}" type="datetimeFigureOut">
               <a:rPr lang="en-US" smtClean="0"/>
-              <a:t>8/29/2020</a:t>
+              <a:t>8/31/2020</a:t>
             </a:fld>
             <a:endParaRPr lang="en-US"/>
           </a:p>
@@ -2067,7 +2077,7 @@
           <a:p>
             <a:fld id="{256199A9-7968-4290-8E97-22DF45FF6498}" type="datetimeFigureOut">
               <a:rPr lang="en-US" smtClean="0"/>
-              <a:t>8/29/2020</a:t>
+              <a:t>8/31/2020</a:t>
             </a:fld>
             <a:endParaRPr lang="en-US"/>
           </a:p>
@@ -2378,7 +2388,7 @@
           <a:p>
             <a:fld id="{256199A9-7968-4290-8E97-22DF45FF6498}" type="datetimeFigureOut">
               <a:rPr lang="en-US" smtClean="0"/>
-              <a:t>8/29/2020</a:t>
+              <a:t>8/31/2020</a:t>
             </a:fld>
             <a:endParaRPr lang="en-US"/>
           </a:p>
@@ -2666,7 +2676,7 @@
           <a:p>
             <a:fld id="{256199A9-7968-4290-8E97-22DF45FF6498}" type="datetimeFigureOut">
               <a:rPr lang="en-US" smtClean="0"/>
-              <a:t>8/29/2020</a:t>
+              <a:t>8/31/2020</a:t>
             </a:fld>
             <a:endParaRPr lang="en-US"/>
           </a:p>
@@ -2907,7 +2917,7 @@
           <a:p>
             <a:fld id="{256199A9-7968-4290-8E97-22DF45FF6498}" type="datetimeFigureOut">
               <a:rPr lang="en-US" smtClean="0"/>
-              <a:t>8/29/2020</a:t>
+              <a:t>8/31/2020</a:t>
             </a:fld>
             <a:endParaRPr lang="en-US"/>
           </a:p>
@@ -3594,7 +3604,7 @@
           <a:p>
             <a:r>
               <a:rPr lang="en-US" dirty="0"/>
-              <a:t>We found this same problem even existing in our university</a:t>
+              <a:t>We found this problem in many universities </a:t>
             </a:r>
           </a:p>
           <a:p>
@@ -3649,6 +3659,385 @@
           <p:cNvPr id="2" name="Title 1">
             <a:extLst>
               <a:ext uri="{FF2B5EF4-FFF2-40B4-BE49-F238E27FC236}">
+                <a16:creationId xmlns:a16="http://schemas.microsoft.com/office/drawing/2014/main" id="{DD54632F-9F74-4508-BFBA-B6EE6BA0678E}"/>
+              </a:ext>
+            </a:extLst>
+          </p:cNvPr>
+          <p:cNvSpPr>
+            <a:spLocks noGrp="1"/>
+          </p:cNvSpPr>
+          <p:nvPr>
+            <p:ph type="title"/>
+          </p:nvPr>
+        </p:nvSpPr>
+        <p:spPr/>
+        <p:txBody>
+          <a:bodyPr/>
+          <a:lstStyle/>
+          <a:p>
+            <a:r>
+              <a:rPr lang="en-US" dirty="0"/>
+              <a:t>Existing Recognition systems</a:t>
+            </a:r>
+          </a:p>
+        </p:txBody>
+      </p:sp>
+      <p:sp>
+        <p:nvSpPr>
+          <p:cNvPr id="3" name="Content Placeholder 2">
+            <a:extLst>
+              <a:ext uri="{FF2B5EF4-FFF2-40B4-BE49-F238E27FC236}">
+                <a16:creationId xmlns:a16="http://schemas.microsoft.com/office/drawing/2014/main" id="{81FDC898-D715-4F2E-B2BA-977FCBCBB71E}"/>
+              </a:ext>
+            </a:extLst>
+          </p:cNvPr>
+          <p:cNvSpPr>
+            <a:spLocks noGrp="1"/>
+          </p:cNvSpPr>
+          <p:nvPr>
+            <p:ph idx="1"/>
+          </p:nvPr>
+        </p:nvSpPr>
+        <p:spPr/>
+        <p:txBody>
+          <a:bodyPr/>
+          <a:lstStyle/>
+          <a:p>
+            <a:r>
+              <a:rPr lang="en-US" dirty="0"/>
+              <a:t>The systems can be broadly classified : </a:t>
+            </a:r>
+          </a:p>
+          <a:p>
+            <a:pPr lvl="1"/>
+            <a:r>
+              <a:rPr lang="en-US" dirty="0"/>
+              <a:t>Systems that uses human characteristics like fingerprint </a:t>
+            </a:r>
+          </a:p>
+          <a:p>
+            <a:pPr lvl="1"/>
+            <a:r>
+              <a:rPr lang="en-US" dirty="0"/>
+              <a:t>Systems that uses unique objects that the person carries like ID card </a:t>
+            </a:r>
+          </a:p>
+        </p:txBody>
+      </p:sp>
+    </p:spTree>
+    <p:extLst>
+      <p:ext uri="{BB962C8B-B14F-4D97-AF65-F5344CB8AC3E}">
+        <p14:creationId xmlns:p14="http://schemas.microsoft.com/office/powerpoint/2010/main" val="3236920408"/>
+      </p:ext>
+    </p:extLst>
+  </p:cSld>
+  <p:clrMapOvr>
+    <a:masterClrMapping/>
+  </p:clrMapOvr>
+</p:sld>
+</file>
+
+<file path=ppt/slides/slide5.xml><?xml version="1.0" encoding="utf-8"?>
+<p:sld xmlns:a="http://schemas.openxmlformats.org/drawingml/2006/main" xmlns:r="http://schemas.openxmlformats.org/officeDocument/2006/relationships" xmlns:p="http://schemas.openxmlformats.org/presentationml/2006/main">
+  <p:cSld>
+    <p:spTree>
+      <p:nvGrpSpPr>
+        <p:cNvPr id="1" name=""/>
+        <p:cNvGrpSpPr/>
+        <p:nvPr/>
+      </p:nvGrpSpPr>
+      <p:grpSpPr>
+        <a:xfrm>
+          <a:off x="0" y="0"/>
+          <a:ext cx="0" cy="0"/>
+          <a:chOff x="0" y="0"/>
+          <a:chExt cx="0" cy="0"/>
+        </a:xfrm>
+      </p:grpSpPr>
+      <p:sp>
+        <p:nvSpPr>
+          <p:cNvPr id="2" name="Title 1">
+            <a:extLst>
+              <a:ext uri="{FF2B5EF4-FFF2-40B4-BE49-F238E27FC236}">
+                <a16:creationId xmlns:a16="http://schemas.microsoft.com/office/drawing/2014/main" id="{6F385D9D-64B5-427B-A379-1F0766EAA10B}"/>
+              </a:ext>
+            </a:extLst>
+          </p:cNvPr>
+          <p:cNvSpPr>
+            <a:spLocks noGrp="1"/>
+          </p:cNvSpPr>
+          <p:nvPr>
+            <p:ph type="title"/>
+          </p:nvPr>
+        </p:nvSpPr>
+        <p:spPr/>
+        <p:txBody>
+          <a:bodyPr/>
+          <a:lstStyle/>
+          <a:p>
+            <a:r>
+              <a:rPr lang="en-US" dirty="0"/>
+              <a:t>Fingerprint based recognition system</a:t>
+            </a:r>
+          </a:p>
+        </p:txBody>
+      </p:sp>
+      <p:sp>
+        <p:nvSpPr>
+          <p:cNvPr id="3" name="Content Placeholder 2">
+            <a:extLst>
+              <a:ext uri="{FF2B5EF4-FFF2-40B4-BE49-F238E27FC236}">
+                <a16:creationId xmlns:a16="http://schemas.microsoft.com/office/drawing/2014/main" id="{9EF272F5-93A5-445D-B1C4-18C2BB06A3C3}"/>
+              </a:ext>
+            </a:extLst>
+          </p:cNvPr>
+          <p:cNvSpPr>
+            <a:spLocks noGrp="1"/>
+          </p:cNvSpPr>
+          <p:nvPr>
+            <p:ph idx="1"/>
+          </p:nvPr>
+        </p:nvSpPr>
+        <p:spPr/>
+        <p:txBody>
+          <a:bodyPr/>
+          <a:lstStyle/>
+          <a:p>
+            <a:r>
+              <a:rPr lang="en-US" dirty="0"/>
+              <a:t>Distracts the attention of students during lecture time </a:t>
+            </a:r>
+          </a:p>
+          <a:p>
+            <a:r>
+              <a:rPr lang="en-US" dirty="0"/>
+              <a:t>Queuing takes place </a:t>
+            </a:r>
+          </a:p>
+          <a:p>
+            <a:endParaRPr lang="en-US" dirty="0"/>
+          </a:p>
+        </p:txBody>
+      </p:sp>
+    </p:spTree>
+    <p:extLst>
+      <p:ext uri="{BB962C8B-B14F-4D97-AF65-F5344CB8AC3E}">
+        <p14:creationId xmlns:p14="http://schemas.microsoft.com/office/powerpoint/2010/main" val="3018979827"/>
+      </p:ext>
+    </p:extLst>
+  </p:cSld>
+  <p:clrMapOvr>
+    <a:masterClrMapping/>
+  </p:clrMapOvr>
+</p:sld>
+</file>
+
+<file path=ppt/slides/slide6.xml><?xml version="1.0" encoding="utf-8"?>
+<p:sld xmlns:a="http://schemas.openxmlformats.org/drawingml/2006/main" xmlns:r="http://schemas.openxmlformats.org/officeDocument/2006/relationships" xmlns:p="http://schemas.openxmlformats.org/presentationml/2006/main">
+  <p:cSld>
+    <p:spTree>
+      <p:nvGrpSpPr>
+        <p:cNvPr id="1" name=""/>
+        <p:cNvGrpSpPr/>
+        <p:nvPr/>
+      </p:nvGrpSpPr>
+      <p:grpSpPr>
+        <a:xfrm>
+          <a:off x="0" y="0"/>
+          <a:ext cx="0" cy="0"/>
+          <a:chOff x="0" y="0"/>
+          <a:chExt cx="0" cy="0"/>
+        </a:xfrm>
+      </p:grpSpPr>
+      <p:sp>
+        <p:nvSpPr>
+          <p:cNvPr id="2" name="Title 1">
+            <a:extLst>
+              <a:ext uri="{FF2B5EF4-FFF2-40B4-BE49-F238E27FC236}">
+                <a16:creationId xmlns:a16="http://schemas.microsoft.com/office/drawing/2014/main" id="{243D4FE6-1920-4284-890C-F4D3CE972990}"/>
+              </a:ext>
+            </a:extLst>
+          </p:cNvPr>
+          <p:cNvSpPr>
+            <a:spLocks noGrp="1"/>
+          </p:cNvSpPr>
+          <p:nvPr>
+            <p:ph type="title"/>
+          </p:nvPr>
+        </p:nvSpPr>
+        <p:spPr/>
+        <p:txBody>
+          <a:bodyPr/>
+          <a:lstStyle/>
+          <a:p>
+            <a:r>
+              <a:rPr lang="en-US" dirty="0"/>
+              <a:t>RFID based recognition</a:t>
+            </a:r>
+          </a:p>
+        </p:txBody>
+      </p:sp>
+      <p:sp>
+        <p:nvSpPr>
+          <p:cNvPr id="3" name="Content Placeholder 2">
+            <a:extLst>
+              <a:ext uri="{FF2B5EF4-FFF2-40B4-BE49-F238E27FC236}">
+                <a16:creationId xmlns:a16="http://schemas.microsoft.com/office/drawing/2014/main" id="{7C4D2BD7-81F9-4FDB-8E4A-25CFDF997547}"/>
+              </a:ext>
+            </a:extLst>
+          </p:cNvPr>
+          <p:cNvSpPr>
+            <a:spLocks noGrp="1"/>
+          </p:cNvSpPr>
+          <p:nvPr>
+            <p:ph idx="1"/>
+          </p:nvPr>
+        </p:nvSpPr>
+        <p:spPr/>
+        <p:txBody>
+          <a:bodyPr/>
+          <a:lstStyle/>
+          <a:p>
+            <a:r>
+              <a:rPr lang="en-US" dirty="0"/>
+              <a:t>Possibilities that 	Fraudulent may occur</a:t>
+            </a:r>
+          </a:p>
+          <a:p>
+            <a:r>
+              <a:rPr lang="en-US" dirty="0"/>
+              <a:t>Cheat the system by giving proxy (for example a student misuse it by wearing another student’s ID card </a:t>
+            </a:r>
+          </a:p>
+        </p:txBody>
+      </p:sp>
+    </p:spTree>
+    <p:extLst>
+      <p:ext uri="{BB962C8B-B14F-4D97-AF65-F5344CB8AC3E}">
+        <p14:creationId xmlns:p14="http://schemas.microsoft.com/office/powerpoint/2010/main" val="670647158"/>
+      </p:ext>
+    </p:extLst>
+  </p:cSld>
+  <p:clrMapOvr>
+    <a:masterClrMapping/>
+  </p:clrMapOvr>
+</p:sld>
+</file>
+
+<file path=ppt/slides/slide7.xml><?xml version="1.0" encoding="utf-8"?>
+<p:sld xmlns:a="http://schemas.openxmlformats.org/drawingml/2006/main" xmlns:r="http://schemas.openxmlformats.org/officeDocument/2006/relationships" xmlns:p="http://schemas.openxmlformats.org/presentationml/2006/main">
+  <p:cSld>
+    <p:spTree>
+      <p:nvGrpSpPr>
+        <p:cNvPr id="1" name=""/>
+        <p:cNvGrpSpPr/>
+        <p:nvPr/>
+      </p:nvGrpSpPr>
+      <p:grpSpPr>
+        <a:xfrm>
+          <a:off x="0" y="0"/>
+          <a:ext cx="0" cy="0"/>
+          <a:chOff x="0" y="0"/>
+          <a:chExt cx="0" cy="0"/>
+        </a:xfrm>
+      </p:grpSpPr>
+      <p:sp>
+        <p:nvSpPr>
+          <p:cNvPr id="2" name="Title 1">
+            <a:extLst>
+              <a:ext uri="{FF2B5EF4-FFF2-40B4-BE49-F238E27FC236}">
+                <a16:creationId xmlns:a16="http://schemas.microsoft.com/office/drawing/2014/main" id="{AA138FD9-CD6D-4510-B391-B248E0EC5C2D}"/>
+              </a:ext>
+            </a:extLst>
+          </p:cNvPr>
+          <p:cNvSpPr>
+            <a:spLocks noGrp="1"/>
+          </p:cNvSpPr>
+          <p:nvPr>
+            <p:ph type="title"/>
+          </p:nvPr>
+        </p:nvSpPr>
+        <p:spPr/>
+        <p:txBody>
+          <a:bodyPr/>
+          <a:lstStyle/>
+          <a:p>
+            <a:r>
+              <a:rPr lang="en-US" dirty="0"/>
+              <a:t>IRIS based recognition system </a:t>
+            </a:r>
+          </a:p>
+        </p:txBody>
+      </p:sp>
+      <p:sp>
+        <p:nvSpPr>
+          <p:cNvPr id="3" name="Content Placeholder 2">
+            <a:extLst>
+              <a:ext uri="{FF2B5EF4-FFF2-40B4-BE49-F238E27FC236}">
+                <a16:creationId xmlns:a16="http://schemas.microsoft.com/office/drawing/2014/main" id="{719AD651-61FA-4F32-A29D-34715D5F6F77}"/>
+              </a:ext>
+            </a:extLst>
+          </p:cNvPr>
+          <p:cNvSpPr>
+            <a:spLocks noGrp="1"/>
+          </p:cNvSpPr>
+          <p:nvPr>
+            <p:ph idx="1"/>
+          </p:nvPr>
+        </p:nvSpPr>
+        <p:spPr/>
+        <p:txBody>
+          <a:bodyPr/>
+          <a:lstStyle/>
+          <a:p>
+            <a:r>
+              <a:rPr lang="en-US" dirty="0"/>
+              <a:t>Cant use a regular camera </a:t>
+            </a:r>
+          </a:p>
+          <a:p>
+            <a:r>
+              <a:rPr lang="en-US" dirty="0"/>
+              <a:t>Visible light must be minimized for maximum accuracy</a:t>
+            </a:r>
+          </a:p>
+        </p:txBody>
+      </p:sp>
+    </p:spTree>
+    <p:extLst>
+      <p:ext uri="{BB962C8B-B14F-4D97-AF65-F5344CB8AC3E}">
+        <p14:creationId xmlns:p14="http://schemas.microsoft.com/office/powerpoint/2010/main" val="3973309270"/>
+      </p:ext>
+    </p:extLst>
+  </p:cSld>
+  <p:clrMapOvr>
+    <a:masterClrMapping/>
+  </p:clrMapOvr>
+</p:sld>
+</file>
+
+<file path=ppt/slides/slide8.xml><?xml version="1.0" encoding="utf-8"?>
+<p:sld xmlns:a="http://schemas.openxmlformats.org/drawingml/2006/main" xmlns:r="http://schemas.openxmlformats.org/officeDocument/2006/relationships" xmlns:p="http://schemas.openxmlformats.org/presentationml/2006/main">
+  <p:cSld>
+    <p:spTree>
+      <p:nvGrpSpPr>
+        <p:cNvPr id="1" name=""/>
+        <p:cNvGrpSpPr/>
+        <p:nvPr/>
+      </p:nvGrpSpPr>
+      <p:grpSpPr>
+        <a:xfrm>
+          <a:off x="0" y="0"/>
+          <a:ext cx="0" cy="0"/>
+          <a:chOff x="0" y="0"/>
+          <a:chExt cx="0" cy="0"/>
+        </a:xfrm>
+      </p:grpSpPr>
+      <p:sp>
+        <p:nvSpPr>
+          <p:cNvPr id="2" name="Title 1">
+            <a:extLst>
+              <a:ext uri="{FF2B5EF4-FFF2-40B4-BE49-F238E27FC236}">
                 <a16:creationId xmlns:a16="http://schemas.microsoft.com/office/drawing/2014/main" id="{34891684-A0C7-4743-A992-FC7093E62660}"/>
               </a:ext>
             </a:extLst>
@@ -3695,8 +4084,40 @@
           <a:p>
             <a:r>
               <a:rPr lang="en-US" dirty="0"/>
-              <a:t>Attendance is monitored and marked present or absent depending upon the time he/ she enters or exits the class .</a:t>
-            </a:r>
+              <a:t>Attendance is monitored and marked present or absent depending upon the time he/ she enters or exits the class . </a:t>
+            </a:r>
+          </a:p>
+          <a:p>
+            <a:r>
+              <a:rPr lang="en-US" dirty="0"/>
+              <a:t>We found that facial recognition overcomes some of the problems that exist in the previously mentioned attendance systems </a:t>
+            </a:r>
+          </a:p>
+          <a:p>
+            <a:r>
+              <a:rPr lang="en-US" dirty="0"/>
+              <a:t>Any facial recognition has 2 steps </a:t>
+            </a:r>
+          </a:p>
+          <a:p>
+            <a:pPr lvl="1"/>
+            <a:r>
+              <a:rPr lang="en-US" dirty="0"/>
+              <a:t>Facial detection – the process of finding a face in a given image </a:t>
+            </a:r>
+          </a:p>
+          <a:p>
+            <a:pPr lvl="1"/>
+            <a:r>
+              <a:rPr lang="en-US" dirty="0"/>
+              <a:t>Facial recognition – the process of identifying the person form the face (example : face id in apple )</a:t>
+            </a:r>
+          </a:p>
+          <a:p>
+            <a:pPr marL="0" indent="0">
+              <a:buNone/>
+            </a:pPr>
+            <a:endParaRPr lang="en-US" dirty="0"/>
           </a:p>
           <a:p>
             <a:endParaRPr lang="en-US" dirty="0"/>
@@ -3707,6 +4128,110 @@
     <p:extLst>
       <p:ext uri="{BB962C8B-B14F-4D97-AF65-F5344CB8AC3E}">
         <p14:creationId xmlns:p14="http://schemas.microsoft.com/office/powerpoint/2010/main" val="3892907736"/>
+      </p:ext>
+    </p:extLst>
+  </p:cSld>
+  <p:clrMapOvr>
+    <a:masterClrMapping/>
+  </p:clrMapOvr>
+</p:sld>
+</file>
+
+<file path=ppt/slides/slide9.xml><?xml version="1.0" encoding="utf-8"?>
+<p:sld xmlns:a="http://schemas.openxmlformats.org/drawingml/2006/main" xmlns:r="http://schemas.openxmlformats.org/officeDocument/2006/relationships" xmlns:p="http://schemas.openxmlformats.org/presentationml/2006/main">
+  <p:cSld>
+    <p:spTree>
+      <p:nvGrpSpPr>
+        <p:cNvPr id="1" name=""/>
+        <p:cNvGrpSpPr/>
+        <p:nvPr/>
+      </p:nvGrpSpPr>
+      <p:grpSpPr>
+        <a:xfrm>
+          <a:off x="0" y="0"/>
+          <a:ext cx="0" cy="0"/>
+          <a:chOff x="0" y="0"/>
+          <a:chExt cx="0" cy="0"/>
+        </a:xfrm>
+      </p:grpSpPr>
+      <p:sp>
+        <p:nvSpPr>
+          <p:cNvPr id="2" name="Title 1">
+            <a:extLst>
+              <a:ext uri="{FF2B5EF4-FFF2-40B4-BE49-F238E27FC236}">
+                <a16:creationId xmlns:a16="http://schemas.microsoft.com/office/drawing/2014/main" id="{ED308C98-EF56-41F1-A0BA-172E7C054BAF}"/>
+              </a:ext>
+            </a:extLst>
+          </p:cNvPr>
+          <p:cNvSpPr>
+            <a:spLocks noGrp="1"/>
+          </p:cNvSpPr>
+          <p:nvPr>
+            <p:ph type="title"/>
+          </p:nvPr>
+        </p:nvSpPr>
+        <p:spPr/>
+        <p:txBody>
+          <a:bodyPr/>
+          <a:lstStyle/>
+          <a:p>
+            <a:r>
+              <a:rPr lang="en-US" dirty="0"/>
+              <a:t>Idea about hardware </a:t>
+            </a:r>
+          </a:p>
+        </p:txBody>
+      </p:sp>
+      <p:sp>
+        <p:nvSpPr>
+          <p:cNvPr id="3" name="Content Placeholder 2">
+            <a:extLst>
+              <a:ext uri="{FF2B5EF4-FFF2-40B4-BE49-F238E27FC236}">
+                <a16:creationId xmlns:a16="http://schemas.microsoft.com/office/drawing/2014/main" id="{59B7EA44-14AC-415A-9A50-73E272C69C44}"/>
+              </a:ext>
+            </a:extLst>
+          </p:cNvPr>
+          <p:cNvSpPr>
+            <a:spLocks noGrp="1"/>
+          </p:cNvSpPr>
+          <p:nvPr>
+            <p:ph idx="1"/>
+          </p:nvPr>
+        </p:nvSpPr>
+        <p:spPr/>
+        <p:txBody>
+          <a:bodyPr/>
+          <a:lstStyle/>
+          <a:p>
+            <a:r>
+              <a:rPr lang="en-US" dirty="0"/>
+              <a:t>Camera is installed in both side of the doors </a:t>
+            </a:r>
+          </a:p>
+          <a:p>
+            <a:r>
+              <a:rPr lang="en-US" dirty="0"/>
+              <a:t>The role of the camera is just to take pictures </a:t>
+            </a:r>
+          </a:p>
+          <a:p>
+            <a:r>
+              <a:rPr lang="en-US" dirty="0"/>
+              <a:t>But the process of facial recognition takes place in another place to decrease the burden on camera </a:t>
+            </a:r>
+          </a:p>
+          <a:p>
+            <a:pPr marL="0" indent="0">
+              <a:buNone/>
+            </a:pPr>
+            <a:endParaRPr lang="en-US" dirty="0"/>
+          </a:p>
+        </p:txBody>
+      </p:sp>
+    </p:spTree>
+    <p:extLst>
+      <p:ext uri="{BB962C8B-B14F-4D97-AF65-F5344CB8AC3E}">
+        <p14:creationId xmlns:p14="http://schemas.microsoft.com/office/powerpoint/2010/main" val="936431316"/>
       </p:ext>
     </p:extLst>
   </p:cSld>

</xml_diff>

<commit_message>
update to probelm statement
</commit_message>
<xml_diff>
--- a/Problem statement.pptx
+++ b/Problem statement.pptx
@@ -3467,9 +3467,10 @@
           <a:lstStyle/>
           <a:p>
             <a:r>
-              <a:rPr lang="en-US" dirty="0"/>
-              <a:t>Previously implementations </a:t>
-            </a:r>
+              <a:rPr lang="en-US"/>
+              <a:t>Previous implementation </a:t>
+            </a:r>
+            <a:endParaRPr lang="en-US" dirty="0"/>
           </a:p>
         </p:txBody>
       </p:sp>

</xml_diff>

<commit_message>
Corrected an error in facial recognition defintion
</commit_message>
<xml_diff>
--- a/Problem statement.pptx
+++ b/Problem statement.pptx
@@ -4299,7 +4299,15 @@
             <a:pPr lvl="1"/>
             <a:r>
               <a:rPr lang="en-US" dirty="0"/>
-              <a:t>Facial recognition – the process of identifying the person form the face (example : face id in apple )</a:t>
+              <a:t>Facial recognition – the process of identifying the person form the image </a:t>
+            </a:r>
+            <a:r>
+              <a:rPr lang="en-US"/>
+              <a:t>of a face </a:t>
+            </a:r>
+            <a:r>
+              <a:rPr lang="en-US" dirty="0"/>
+              <a:t>(example : face id in apple )</a:t>
             </a:r>
           </a:p>
           <a:p>

</xml_diff>